<commit_message>
added repo address to pptx
</commit_message>
<xml_diff>
--- a/Docs/IA_OneDay_Azure.pptx
+++ b/Docs/IA_OneDay_Azure.pptx
@@ -244,7 +244,7 @@
           <a:p>
             <a:fld id="{0AFB4FA7-6698-4913-BA29-C460E114679D}" type="datetimeFigureOut">
               <a:rPr lang="en-US" smtClean="0"/>
-              <a:t>11/7/2017</a:t>
+              <a:t>11/10/2017</a:t>
             </a:fld>
             <a:endParaRPr lang="en-US"/>
           </a:p>
@@ -2172,7 +2172,7 @@
             <a:fld id="{B61BEF0D-F0BB-DE4B-95CE-6DB70DBA9567}" type="datetimeFigureOut">
               <a:rPr lang="en-US" smtClean="0"/>
               <a:pPr/>
-              <a:t>11/7/2017</a:t>
+              <a:t>11/10/2017</a:t>
             </a:fld>
             <a:endParaRPr lang="en-US"/>
           </a:p>
@@ -2507,7 +2507,7 @@
             <a:fld id="{B61BEF0D-F0BB-DE4B-95CE-6DB70DBA9567}" type="datetimeFigureOut">
               <a:rPr lang="en-US" dirty="0"/>
               <a:pPr/>
-              <a:t>11/7/2017</a:t>
+              <a:t>11/10/2017</a:t>
             </a:fld>
             <a:endParaRPr lang="en-US"/>
           </a:p>
@@ -2796,7 +2796,7 @@
             <a:fld id="{B61BEF0D-F0BB-DE4B-95CE-6DB70DBA9567}" type="datetimeFigureOut">
               <a:rPr lang="en-US" dirty="0"/>
               <a:pPr/>
-              <a:t>11/7/2017</a:t>
+              <a:t>11/10/2017</a:t>
             </a:fld>
             <a:endParaRPr lang="en-US"/>
           </a:p>
@@ -3043,7 +3043,7 @@
             <a:fld id="{B61BEF0D-F0BB-DE4B-95CE-6DB70DBA9567}" type="datetimeFigureOut">
               <a:rPr lang="en-US" dirty="0"/>
               <a:pPr/>
-              <a:t>11/7/2017</a:t>
+              <a:t>11/10/2017</a:t>
             </a:fld>
             <a:endParaRPr lang="en-US"/>
           </a:p>
@@ -3582,7 +3582,7 @@
             <a:fld id="{B61BEF0D-F0BB-DE4B-95CE-6DB70DBA9567}" type="datetimeFigureOut">
               <a:rPr lang="en-US" dirty="0"/>
               <a:pPr/>
-              <a:t>11/7/2017</a:t>
+              <a:t>11/10/2017</a:t>
             </a:fld>
             <a:endParaRPr lang="en-US"/>
           </a:p>
@@ -3829,7 +3829,7 @@
             <a:fld id="{B61BEF0D-F0BB-DE4B-95CE-6DB70DBA9567}" type="datetimeFigureOut">
               <a:rPr lang="en-US" dirty="0"/>
               <a:pPr/>
-              <a:t>11/7/2017</a:t>
+              <a:t>11/10/2017</a:t>
             </a:fld>
             <a:endParaRPr lang="en-US"/>
           </a:p>
@@ -4360,7 +4360,7 @@
             <a:fld id="{B61BEF0D-F0BB-DE4B-95CE-6DB70DBA9567}" type="datetimeFigureOut">
               <a:rPr lang="en-US" dirty="0"/>
               <a:pPr/>
-              <a:t>11/7/2017</a:t>
+              <a:t>11/10/2017</a:t>
             </a:fld>
             <a:endParaRPr lang="en-US"/>
           </a:p>
@@ -4656,7 +4656,7 @@
             <a:fld id="{B61BEF0D-F0BB-DE4B-95CE-6DB70DBA9567}" type="datetimeFigureOut">
               <a:rPr lang="en-US" dirty="0"/>
               <a:pPr/>
-              <a:t>11/7/2017</a:t>
+              <a:t>11/10/2017</a:t>
             </a:fld>
             <a:endParaRPr lang="en-US"/>
           </a:p>
@@ -4828,7 +4828,7 @@
             <a:fld id="{B61BEF0D-F0BB-DE4B-95CE-6DB70DBA9567}" type="datetimeFigureOut">
               <a:rPr lang="en-US" dirty="0"/>
               <a:pPr/>
-              <a:t>11/7/2017</a:t>
+              <a:t>11/10/2017</a:t>
             </a:fld>
             <a:endParaRPr lang="en-US"/>
           </a:p>
@@ -5006,7 +5006,7 @@
             <a:fld id="{B61BEF0D-F0BB-DE4B-95CE-6DB70DBA9567}" type="datetimeFigureOut">
               <a:rPr lang="en-US" dirty="0"/>
               <a:pPr/>
-              <a:t>11/7/2017</a:t>
+              <a:t>11/10/2017</a:t>
             </a:fld>
             <a:endParaRPr lang="en-US"/>
           </a:p>
@@ -5101,7 +5101,7 @@
             <a:fld id="{B61BEF0D-F0BB-DE4B-95CE-6DB70DBA9567}" type="datetimeFigureOut">
               <a:rPr lang="en-US" dirty="0"/>
               <a:pPr/>
-              <a:t>11/7/2017</a:t>
+              <a:t>11/10/2017</a:t>
             </a:fld>
             <a:endParaRPr lang="en-US"/>
           </a:p>
@@ -5315,7 +5315,7 @@
             <a:fld id="{B61BEF0D-F0BB-DE4B-95CE-6DB70DBA9567}" type="datetimeFigureOut">
               <a:rPr lang="en-US" dirty="0"/>
               <a:pPr/>
-              <a:t>11/7/2017</a:t>
+              <a:t>11/10/2017</a:t>
             </a:fld>
             <a:endParaRPr lang="en-US"/>
           </a:p>
@@ -5510,7 +5510,7 @@
             <a:fld id="{B61BEF0D-F0BB-DE4B-95CE-6DB70DBA9567}" type="datetimeFigureOut">
               <a:rPr lang="en-US" smtClean="0"/>
               <a:pPr/>
-              <a:t>11/7/2017</a:t>
+              <a:t>11/10/2017</a:t>
             </a:fld>
             <a:endParaRPr lang="en-US"/>
           </a:p>
@@ -5708,7 +5708,7 @@
             <a:fld id="{B61BEF0D-F0BB-DE4B-95CE-6DB70DBA9567}" type="datetimeFigureOut">
               <a:rPr lang="en-US" smtClean="0"/>
               <a:pPr/>
-              <a:t>11/7/2017</a:t>
+              <a:t>11/10/2017</a:t>
             </a:fld>
             <a:endParaRPr lang="en-US"/>
           </a:p>
@@ -5958,7 +5958,7 @@
             <a:fld id="{B61BEF0D-F0BB-DE4B-95CE-6DB70DBA9567}" type="datetimeFigureOut">
               <a:rPr lang="en-US" smtClean="0"/>
               <a:pPr/>
-              <a:t>11/7/2017</a:t>
+              <a:t>11/10/2017</a:t>
             </a:fld>
             <a:endParaRPr lang="en-US"/>
           </a:p>
@@ -6192,7 +6192,7 @@
             <a:fld id="{B61BEF0D-F0BB-DE4B-95CE-6DB70DBA9567}" type="datetimeFigureOut">
               <a:rPr lang="en-US" smtClean="0"/>
               <a:pPr/>
-              <a:t>11/7/2017</a:t>
+              <a:t>11/10/2017</a:t>
             </a:fld>
             <a:endParaRPr lang="en-US"/>
           </a:p>
@@ -6561,7 +6561,7 @@
             <a:fld id="{B61BEF0D-F0BB-DE4B-95CE-6DB70DBA9567}" type="datetimeFigureOut">
               <a:rPr lang="en-US" smtClean="0"/>
               <a:pPr/>
-              <a:t>11/7/2017</a:t>
+              <a:t>11/10/2017</a:t>
             </a:fld>
             <a:endParaRPr lang="en-US"/>
           </a:p>
@@ -6683,7 +6683,7 @@
             <a:fld id="{B61BEF0D-F0BB-DE4B-95CE-6DB70DBA9567}" type="datetimeFigureOut">
               <a:rPr lang="en-US" smtClean="0"/>
               <a:pPr/>
-              <a:t>11/7/2017</a:t>
+              <a:t>11/10/2017</a:t>
             </a:fld>
             <a:endParaRPr lang="en-US"/>
           </a:p>
@@ -6783,7 +6783,7 @@
             <a:fld id="{B61BEF0D-F0BB-DE4B-95CE-6DB70DBA9567}" type="datetimeFigureOut">
               <a:rPr lang="en-US" smtClean="0"/>
               <a:pPr/>
-              <a:t>11/7/2017</a:t>
+              <a:t>11/10/2017</a:t>
             </a:fld>
             <a:endParaRPr lang="en-US"/>
           </a:p>
@@ -7063,7 +7063,7 @@
             <a:fld id="{B61BEF0D-F0BB-DE4B-95CE-6DB70DBA9567}" type="datetimeFigureOut">
               <a:rPr lang="en-US" smtClean="0"/>
               <a:pPr/>
-              <a:t>11/7/2017</a:t>
+              <a:t>11/10/2017</a:t>
             </a:fld>
             <a:endParaRPr lang="en-US"/>
           </a:p>
@@ -7323,7 +7323,7 @@
             <a:fld id="{B61BEF0D-F0BB-DE4B-95CE-6DB70DBA9567}" type="datetimeFigureOut">
               <a:rPr lang="en-US" smtClean="0"/>
               <a:pPr/>
-              <a:t>11/7/2017</a:t>
+              <a:t>11/10/2017</a:t>
             </a:fld>
             <a:endParaRPr lang="en-US"/>
           </a:p>
@@ -7496,7 +7496,7 @@
             <a:fld id="{B61BEF0D-F0BB-DE4B-95CE-6DB70DBA9567}" type="datetimeFigureOut">
               <a:rPr lang="en-US" smtClean="0"/>
               <a:pPr/>
-              <a:t>11/7/2017</a:t>
+              <a:t>11/10/2017</a:t>
             </a:fld>
             <a:endParaRPr lang="en-US"/>
           </a:p>
@@ -7626,7 +7626,7 @@
             <a:fld id="{B61BEF0D-F0BB-DE4B-95CE-6DB70DBA9567}" type="datetimeFigureOut">
               <a:rPr lang="en-US" dirty="0"/>
               <a:pPr/>
-              <a:t>11/7/2017</a:t>
+              <a:t>11/10/2017</a:t>
             </a:fld>
             <a:endParaRPr lang="en-US"/>
           </a:p>
@@ -7814,7 +7814,7 @@
             <a:fld id="{B61BEF0D-F0BB-DE4B-95CE-6DB70DBA9567}" type="datetimeFigureOut">
               <a:rPr lang="en-US" smtClean="0"/>
               <a:pPr/>
-              <a:t>11/7/2017</a:t>
+              <a:t>11/10/2017</a:t>
             </a:fld>
             <a:endParaRPr lang="en-US"/>
           </a:p>
@@ -7986,7 +7986,7 @@
           <a:p>
             <a:fld id="{B645C266-14C2-45DB-BF1E-55F4FE14172A}" type="datetimeFigureOut">
               <a:rPr lang="en-US" smtClean="0"/>
-              <a:t>11/7/2017</a:t>
+              <a:t>11/10/2017</a:t>
             </a:fld>
             <a:endParaRPr lang="en-US"/>
           </a:p>
@@ -8111,7 +8111,7 @@
             <a:fld id="{B61BEF0D-F0BB-DE4B-95CE-6DB70DBA9567}" type="datetimeFigureOut">
               <a:rPr lang="en-US" dirty="0"/>
               <a:pPr/>
-              <a:t>11/7/2017</a:t>
+              <a:t>11/10/2017</a:t>
             </a:fld>
             <a:endParaRPr lang="en-US"/>
           </a:p>
@@ -8216,7 +8216,7 @@
             <a:fld id="{B61BEF0D-F0BB-DE4B-95CE-6DB70DBA9567}" type="datetimeFigureOut">
               <a:rPr lang="en-US" dirty="0"/>
               <a:pPr/>
-              <a:t>11/7/2017</a:t>
+              <a:t>11/10/2017</a:t>
             </a:fld>
             <a:endParaRPr lang="en-US"/>
           </a:p>
@@ -8969,7 +8969,7 @@
             <a:fld id="{B61BEF0D-F0BB-DE4B-95CE-6DB70DBA9567}" type="datetimeFigureOut">
               <a:rPr lang="en-US" dirty="0"/>
               <a:pPr/>
-              <a:t>11/7/2017</a:t>
+              <a:t>11/10/2017</a:t>
             </a:fld>
             <a:endParaRPr lang="en-US"/>
           </a:p>
@@ -9263,7 +9263,7 @@
             <a:fld id="{B61BEF0D-F0BB-DE4B-95CE-6DB70DBA9567}" type="datetimeFigureOut">
               <a:rPr lang="en-US" dirty="0"/>
               <a:pPr/>
-              <a:t>11/7/2017</a:t>
+              <a:t>11/10/2017</a:t>
             </a:fld>
             <a:endParaRPr lang="en-US"/>
           </a:p>
@@ -9698,7 +9698,7 @@
             <a:fld id="{B61BEF0D-F0BB-DE4B-95CE-6DB70DBA9567}" type="datetimeFigureOut">
               <a:rPr lang="en-US" dirty="0"/>
               <a:pPr/>
-              <a:t>11/7/2017</a:t>
+              <a:t>11/10/2017</a:t>
             </a:fld>
             <a:endParaRPr lang="en-US"/>
           </a:p>
@@ -9815,7 +9815,7 @@
             <a:fld id="{B61BEF0D-F0BB-DE4B-95CE-6DB70DBA9567}" type="datetimeFigureOut">
               <a:rPr lang="en-US" dirty="0"/>
               <a:pPr/>
-              <a:t>11/7/2017</a:t>
+              <a:t>11/10/2017</a:t>
             </a:fld>
             <a:endParaRPr lang="en-US"/>
           </a:p>
@@ -9910,7 +9910,7 @@
             <a:fld id="{B61BEF0D-F0BB-DE4B-95CE-6DB70DBA9567}" type="datetimeFigureOut">
               <a:rPr lang="en-US" dirty="0"/>
               <a:pPr/>
-              <a:t>11/7/2017</a:t>
+              <a:t>11/10/2017</a:t>
             </a:fld>
             <a:endParaRPr lang="en-US"/>
           </a:p>
@@ -10191,7 +10191,7 @@
             <a:fld id="{B61BEF0D-F0BB-DE4B-95CE-6DB70DBA9567}" type="datetimeFigureOut">
               <a:rPr lang="en-US" dirty="0"/>
               <a:pPr/>
-              <a:t>11/7/2017</a:t>
+              <a:t>11/10/2017</a:t>
             </a:fld>
             <a:endParaRPr lang="en-US"/>
           </a:p>
@@ -10734,7 +10734,7 @@
             <a:fld id="{B61BEF0D-F0BB-DE4B-95CE-6DB70DBA9567}" type="datetimeFigureOut">
               <a:rPr lang="en-US" smtClean="0"/>
               <a:pPr/>
-              <a:t>11/7/2017</a:t>
+              <a:t>11/10/2017</a:t>
             </a:fld>
             <a:endParaRPr lang="en-US"/>
           </a:p>
@@ -11417,7 +11417,7 @@
           <a:p>
             <a:fld id="{956E8CAF-C796-4DD7-94D7-FA0C4ED66C95}" type="datetimeFigureOut">
               <a:rPr lang="en-US" smtClean="0"/>
-              <a:t>11/7/2017</a:t>
+              <a:t>11/10/2017</a:t>
             </a:fld>
             <a:endParaRPr lang="en-US"/>
           </a:p>
@@ -13933,14 +13933,49 @@
         </p:blipFill>
         <p:spPr>
           <a:xfrm>
-            <a:off x="2881040" y="2046769"/>
-            <a:ext cx="7599044" cy="3902410"/>
+            <a:off x="2475168" y="1685581"/>
+            <a:ext cx="8302373" cy="4263597"/>
           </a:xfrm>
           <a:prstGeom prst="rect">
             <a:avLst/>
           </a:prstGeom>
         </p:spPr>
       </p:pic>
+      <p:sp>
+        <p:nvSpPr>
+          <p:cNvPr id="3" name="TextBox 2">
+            <a:extLst>
+              <a:ext uri="{FF2B5EF4-FFF2-40B4-BE49-F238E27FC236}">
+                <a16:creationId xmlns:a16="http://schemas.microsoft.com/office/drawing/2014/main" id="{264D2CB5-B685-4242-96FE-5A75BA31DB21}"/>
+              </a:ext>
+            </a:extLst>
+          </p:cNvPr>
+          <p:cNvSpPr txBox="1"/>
+          <p:nvPr/>
+        </p:nvSpPr>
+        <p:spPr>
+          <a:xfrm flipH="1">
+            <a:off x="4296234" y="1685581"/>
+            <a:ext cx="5101152" cy="369332"/>
+          </a:xfrm>
+          <a:prstGeom prst="rect">
+            <a:avLst/>
+          </a:prstGeom>
+          <a:noFill/>
+        </p:spPr>
+        <p:txBody>
+          <a:bodyPr wrap="square" rtlCol="0">
+            <a:spAutoFit/>
+          </a:bodyPr>
+          <a:lstStyle/>
+          <a:p>
+            <a:r>
+              <a:rPr lang="en-US" dirty="0"/>
+              <a:t>Repo: https://github.com/johnglisson/IAOneDay</a:t>
+            </a:r>
+          </a:p>
+        </p:txBody>
+      </p:sp>
     </p:spTree>
     <p:extLst>
       <p:ext uri="{BB962C8B-B14F-4D97-AF65-F5344CB8AC3E}">
@@ -16666,6 +16701,12 @@
 </file>
 
 <file path=customXml/item1.xml><?xml version="1.0" encoding="utf-8"?>
+<p:properties xmlns:p="http://schemas.microsoft.com/office/2006/metadata/properties" xmlns:xsi="http://www.w3.org/2001/XMLSchema-instance" xmlns:pc="http://schemas.microsoft.com/office/infopath/2007/PartnerControls">
+  <documentManagement/>
+</p:properties>
+</file>
+
+<file path=customXml/item2.xml><?xml version="1.0" encoding="utf-8"?>
 <ct:contentTypeSchema xmlns:ct="http://schemas.microsoft.com/office/2006/metadata/contentType" xmlns:ma="http://schemas.microsoft.com/office/2006/metadata/properties/metaAttributes" ct:_="" ma:_="" ma:contentTypeName="Document" ma:contentTypeID="0x0101002C9267F215FF1E42954B92B5CA29562B" ma:contentTypeVersion="2" ma:contentTypeDescription="Create a new document." ma:contentTypeScope="" ma:versionID="fda6c542c7dcf2d0c03b2ab11e1a5f3a">
   <xsd:schema xmlns:xsd="http://www.w3.org/2001/XMLSchema" xmlns:xs="http://www.w3.org/2001/XMLSchema" xmlns:p="http://schemas.microsoft.com/office/2006/metadata/properties" xmlns:ns2="7382964a-ab7e-479b-8672-6bc6ddada04b" targetNamespace="http://schemas.microsoft.com/office/2006/metadata/properties" ma:root="true" ma:fieldsID="51579991f9a93de9f39b74a4b151cd6f" ns2:_="">
     <xsd:import namespace="7382964a-ab7e-479b-8672-6bc6ddada04b"/>
@@ -16797,12 +16838,6 @@
 </ct:contentTypeSchema>
 </file>
 
-<file path=customXml/item2.xml><?xml version="1.0" encoding="utf-8"?>
-<p:properties xmlns:p="http://schemas.microsoft.com/office/2006/metadata/properties" xmlns:xsi="http://www.w3.org/2001/XMLSchema-instance" xmlns:pc="http://schemas.microsoft.com/office/infopath/2007/PartnerControls">
-  <documentManagement/>
-</p:properties>
-</file>
-
 <file path=customXml/item3.xml><?xml version="1.0" encoding="utf-8"?>
 <?mso-contentType ?>
 <FormTemplates xmlns="http://schemas.microsoft.com/sharepoint/v3/contenttype/forms">
@@ -16813,6 +16848,22 @@
 </file>
 
 <file path=customXml/itemProps1.xml><?xml version="1.0" encoding="utf-8"?>
+<ds:datastoreItem xmlns:ds="http://schemas.openxmlformats.org/officeDocument/2006/customXml" ds:itemID="{BCE93D75-22FB-4591-85A9-691A345F2C2A}">
+  <ds:schemaRefs>
+    <ds:schemaRef ds:uri="http://schemas.microsoft.com/office/infopath/2007/PartnerControls"/>
+    <ds:schemaRef ds:uri="7382964a-ab7e-479b-8672-6bc6ddada04b"/>
+    <ds:schemaRef ds:uri="http://purl.org/dc/elements/1.1/"/>
+    <ds:schemaRef ds:uri="http://schemas.microsoft.com/office/2006/metadata/properties"/>
+    <ds:schemaRef ds:uri="http://schemas.microsoft.com/office/2006/documentManagement/types"/>
+    <ds:schemaRef ds:uri="http://purl.org/dc/terms/"/>
+    <ds:schemaRef ds:uri="http://schemas.openxmlformats.org/package/2006/metadata/core-properties"/>
+    <ds:schemaRef ds:uri="http://purl.org/dc/dcmitype/"/>
+    <ds:schemaRef ds:uri="http://www.w3.org/XML/1998/namespace"/>
+  </ds:schemaRefs>
+</ds:datastoreItem>
+</file>
+
+<file path=customXml/itemProps2.xml><?xml version="1.0" encoding="utf-8"?>
 <ds:datastoreItem xmlns:ds="http://schemas.openxmlformats.org/officeDocument/2006/customXml" ds:itemID="{A9CBFED1-9696-49D6-9618-B2446114957C}">
   <ds:schemaRefs>
     <ds:schemaRef ds:uri="http://schemas.microsoft.com/office/2006/metadata/contentType"/>
@@ -16830,22 +16881,6 @@
 </ds:datastoreItem>
 </file>
 
-<file path=customXml/itemProps2.xml><?xml version="1.0" encoding="utf-8"?>
-<ds:datastoreItem xmlns:ds="http://schemas.openxmlformats.org/officeDocument/2006/customXml" ds:itemID="{BCE93D75-22FB-4591-85A9-691A345F2C2A}">
-  <ds:schemaRefs>
-    <ds:schemaRef ds:uri="http://schemas.microsoft.com/office/infopath/2007/PartnerControls"/>
-    <ds:schemaRef ds:uri="7382964a-ab7e-479b-8672-6bc6ddada04b"/>
-    <ds:schemaRef ds:uri="http://purl.org/dc/elements/1.1/"/>
-    <ds:schemaRef ds:uri="http://schemas.microsoft.com/office/2006/metadata/properties"/>
-    <ds:schemaRef ds:uri="http://schemas.microsoft.com/office/2006/documentManagement/types"/>
-    <ds:schemaRef ds:uri="http://purl.org/dc/terms/"/>
-    <ds:schemaRef ds:uri="http://schemas.openxmlformats.org/package/2006/metadata/core-properties"/>
-    <ds:schemaRef ds:uri="http://purl.org/dc/dcmitype/"/>
-    <ds:schemaRef ds:uri="http://www.w3.org/XML/1998/namespace"/>
-  </ds:schemaRefs>
-</ds:datastoreItem>
-</file>
-
 <file path=customXml/itemProps3.xml><?xml version="1.0" encoding="utf-8"?>
 <ds:datastoreItem xmlns:ds="http://schemas.openxmlformats.org/officeDocument/2006/customXml" ds:itemID="{35716B5C-A2BF-4AF0-930F-734369349F6C}">
   <ds:schemaRefs>

</xml_diff>

<commit_message>
added notes to pptx and re-ordered a slide
</commit_message>
<xml_diff>
--- a/Docs/IA_OneDay_Azure.pptx
+++ b/Docs/IA_OneDay_Azure.pptx
@@ -28,9 +28,9 @@
     <p:sldId id="279" r:id="rId22"/>
     <p:sldId id="303" r:id="rId23"/>
     <p:sldId id="299" r:id="rId24"/>
-    <p:sldId id="300" r:id="rId25"/>
-    <p:sldId id="301" r:id="rId26"/>
-    <p:sldId id="302" r:id="rId27"/>
+    <p:sldId id="302" r:id="rId25"/>
+    <p:sldId id="300" r:id="rId26"/>
+    <p:sldId id="301" r:id="rId27"/>
     <p:sldId id="287" r:id="rId28"/>
     <p:sldId id="304" r:id="rId29"/>
     <p:sldId id="288" r:id="rId30"/>
@@ -723,12 +723,6 @@
           <a:bodyPr/>
           <a:lstStyle/>
           <a:p>
-            <a:r>
-              <a:rPr lang="en-US" dirty="0"/>
-              <a:t>Custom queries against real time logs, visualize data, auto identification of outliers </a:t>
-            </a:r>
-          </a:p>
-          <a:p>
             <a:endParaRPr lang="en-US" dirty="0"/>
           </a:p>
         </p:txBody>
@@ -759,7 +753,7 @@
     </p:spTree>
     <p:extLst>
       <p:ext uri="{BB962C8B-B14F-4D97-AF65-F5344CB8AC3E}">
-        <p14:creationId xmlns:p14="http://schemas.microsoft.com/office/powerpoint/2010/main" val="2697011663"/>
+        <p14:creationId xmlns:p14="http://schemas.microsoft.com/office/powerpoint/2010/main" val="940566210"/>
       </p:ext>
     </p:extLst>
   </p:cSld>
@@ -815,8 +809,11 @@
           <a:p>
             <a:r>
               <a:rPr lang="en-US" dirty="0"/>
-              <a:t>Automatic investigation into what may have caused the issue</a:t>
-            </a:r>
+              <a:t>Custom queries against real time logs, visualize data, auto identification of outliers </a:t>
+            </a:r>
+          </a:p>
+          <a:p>
+            <a:endParaRPr lang="en-US" dirty="0"/>
           </a:p>
         </p:txBody>
       </p:sp>
@@ -846,7 +843,7 @@
     </p:spTree>
     <p:extLst>
       <p:ext uri="{BB962C8B-B14F-4D97-AF65-F5344CB8AC3E}">
-        <p14:creationId xmlns:p14="http://schemas.microsoft.com/office/powerpoint/2010/main" val="3891988100"/>
+        <p14:creationId xmlns:p14="http://schemas.microsoft.com/office/powerpoint/2010/main" val="2697011663"/>
       </p:ext>
     </p:extLst>
   </p:cSld>
@@ -900,7 +897,10 @@
           <a:bodyPr/>
           <a:lstStyle/>
           <a:p>
-            <a:endParaRPr lang="en-US" dirty="0"/>
+            <a:r>
+              <a:rPr lang="en-US" dirty="0"/>
+              <a:t>Automatic investigation into what may have caused the issue</a:t>
+            </a:r>
           </a:p>
         </p:txBody>
       </p:sp>
@@ -930,7 +930,7 @@
     </p:spTree>
     <p:extLst>
       <p:ext uri="{BB962C8B-B14F-4D97-AF65-F5344CB8AC3E}">
-        <p14:creationId xmlns:p14="http://schemas.microsoft.com/office/powerpoint/2010/main" val="940566210"/>
+        <p14:creationId xmlns:p14="http://schemas.microsoft.com/office/powerpoint/2010/main" val="3891988100"/>
       </p:ext>
     </p:extLst>
   </p:cSld>
@@ -1421,6 +1421,27 @@
               <a:t>Don’t really want to spend much time here, more that it is SQL Server in the cloud, and while not everything works the same as SQL on premises it’s not too far off either.</a:t>
             </a:r>
           </a:p>
+          <a:p>
+            <a:endParaRPr lang="en-US" dirty="0"/>
+          </a:p>
+          <a:p>
+            <a:r>
+              <a:rPr lang="en-US" dirty="0"/>
+              <a:t>Additional Links: </a:t>
+            </a:r>
+          </a:p>
+          <a:p>
+            <a:r>
+              <a:rPr lang="en-US" dirty="0"/>
+              <a:t>https://docs.microsoft.com/en-us/azure/sql-database/sql-database-transact-sql-information</a:t>
+            </a:r>
+          </a:p>
+          <a:p>
+            <a:r>
+              <a:rPr lang="en-US" dirty="0"/>
+              <a:t>https://docs.microsoft.com/en-us/azure/sql-database/sql-database-features</a:t>
+            </a:r>
+          </a:p>
         </p:txBody>
       </p:sp>
       <p:sp>
@@ -1505,8 +1526,23 @@
           <a:p>
             <a:r>
               <a:rPr lang="en-US" dirty="0"/>
-              <a:t>Quick example of when each NOSQL options makes the most sense; most of the details here will come in on the demo – scaling, indexing, working with spatial data</a:t>
-            </a:r>
+              <a:t>Document DB API – extensible via JavaScript also supports stored procs, triggers, and UDFs</a:t>
+            </a:r>
+          </a:p>
+          <a:p>
+            <a:r>
+              <a:rPr lang="en-US" dirty="0"/>
+              <a:t>MongoDB – Similar to DB, however directly support most (some) features available in native MongoDB</a:t>
+            </a:r>
+          </a:p>
+          <a:p>
+            <a:r>
+              <a:rPr lang="en-US" dirty="0"/>
+              <a:t>Graph API – High performance searches through relationships</a:t>
+            </a:r>
+          </a:p>
+          <a:p>
+            <a:endParaRPr lang="en-US" dirty="0"/>
           </a:p>
         </p:txBody>
       </p:sp>
@@ -13538,6 +13574,99 @@
           <p:cNvPr id="2" name="Title 1">
             <a:extLst>
               <a:ext uri="{FF2B5EF4-FFF2-40B4-BE49-F238E27FC236}">
+                <a16:creationId xmlns:a16="http://schemas.microsoft.com/office/drawing/2014/main" id="{B80112D7-72C3-443B-8C4A-A4CE04E4CA6B}"/>
+              </a:ext>
+            </a:extLst>
+          </p:cNvPr>
+          <p:cNvSpPr>
+            <a:spLocks noGrp="1"/>
+          </p:cNvSpPr>
+          <p:nvPr>
+            <p:ph type="title"/>
+          </p:nvPr>
+        </p:nvSpPr>
+        <p:spPr/>
+        <p:txBody>
+          <a:bodyPr/>
+          <a:lstStyle/>
+          <a:p>
+            <a:r>
+              <a:rPr lang="en-US" dirty="0"/>
+              <a:t>Application Insights (cont.)</a:t>
+            </a:r>
+          </a:p>
+        </p:txBody>
+      </p:sp>
+      <p:pic>
+        <p:nvPicPr>
+          <p:cNvPr id="4" name="Content Placeholder 3">
+            <a:extLst>
+              <a:ext uri="{FF2B5EF4-FFF2-40B4-BE49-F238E27FC236}">
+                <a16:creationId xmlns:a16="http://schemas.microsoft.com/office/drawing/2014/main" id="{4087A6F5-422B-40C7-A5F8-7564A090BABC}"/>
+              </a:ext>
+            </a:extLst>
+          </p:cNvPr>
+          <p:cNvPicPr>
+            <a:picLocks noGrp="1" noChangeAspect="1"/>
+          </p:cNvPicPr>
+          <p:nvPr>
+            <p:ph idx="1"/>
+          </p:nvPr>
+        </p:nvPicPr>
+        <p:blipFill>
+          <a:blip r:embed="rId3"/>
+          <a:stretch>
+            <a:fillRect/>
+          </a:stretch>
+        </p:blipFill>
+        <p:spPr>
+          <a:xfrm>
+            <a:off x="2706859" y="1223963"/>
+            <a:ext cx="8376895" cy="4875212"/>
+          </a:xfrm>
+          <a:prstGeom prst="rect">
+            <a:avLst/>
+          </a:prstGeom>
+        </p:spPr>
+      </p:pic>
+    </p:spTree>
+    <p:extLst>
+      <p:ext uri="{BB962C8B-B14F-4D97-AF65-F5344CB8AC3E}">
+        <p14:creationId xmlns:p14="http://schemas.microsoft.com/office/powerpoint/2010/main" val="3972802847"/>
+      </p:ext>
+    </p:extLst>
+  </p:cSld>
+  <p:clrMapOvr>
+    <a:masterClrMapping/>
+  </p:clrMapOvr>
+  <p:transition spd="med">
+    <p:pull/>
+  </p:transition>
+</p:sld>
+</file>
+
+<file path=ppt/slides/slide21.xml><?xml version="1.0" encoding="utf-8"?>
+<p:sld xmlns:a="http://schemas.openxmlformats.org/drawingml/2006/main" xmlns:r="http://schemas.openxmlformats.org/officeDocument/2006/relationships" xmlns:p="http://schemas.openxmlformats.org/presentationml/2006/main">
+  <p:cSld>
+    <p:spTree>
+      <p:nvGrpSpPr>
+        <p:cNvPr id="1" name=""/>
+        <p:cNvGrpSpPr/>
+        <p:nvPr/>
+      </p:nvGrpSpPr>
+      <p:grpSpPr>
+        <a:xfrm>
+          <a:off x="0" y="0"/>
+          <a:ext cx="0" cy="0"/>
+          <a:chOff x="0" y="0"/>
+          <a:chExt cx="0" cy="0"/>
+        </a:xfrm>
+      </p:grpSpPr>
+      <p:sp>
+        <p:nvSpPr>
+          <p:cNvPr id="2" name="Title 1">
+            <a:extLst>
+              <a:ext uri="{FF2B5EF4-FFF2-40B4-BE49-F238E27FC236}">
                 <a16:creationId xmlns:a16="http://schemas.microsoft.com/office/drawing/2014/main" id="{2DE04CD3-9E66-4B47-BAEB-311877FF8FD1}"/>
               </a:ext>
             </a:extLst>
@@ -13609,7 +13738,7 @@
 </p:sld>
 </file>
 
-<file path=ppt/slides/slide21.xml><?xml version="1.0" encoding="utf-8"?>
+<file path=ppt/slides/slide22.xml><?xml version="1.0" encoding="utf-8"?>
 <p:sld xmlns:a="http://schemas.openxmlformats.org/drawingml/2006/main" xmlns:r="http://schemas.openxmlformats.org/officeDocument/2006/relationships" xmlns:p="http://schemas.openxmlformats.org/presentationml/2006/main">
   <p:cSld>
     <p:spTree>
@@ -13690,99 +13819,6 @@
     <p:extLst>
       <p:ext uri="{BB962C8B-B14F-4D97-AF65-F5344CB8AC3E}">
         <p14:creationId xmlns:p14="http://schemas.microsoft.com/office/powerpoint/2010/main" val="3730175486"/>
-      </p:ext>
-    </p:extLst>
-  </p:cSld>
-  <p:clrMapOvr>
-    <a:masterClrMapping/>
-  </p:clrMapOvr>
-  <p:transition spd="med">
-    <p:pull/>
-  </p:transition>
-</p:sld>
-</file>
-
-<file path=ppt/slides/slide22.xml><?xml version="1.0" encoding="utf-8"?>
-<p:sld xmlns:a="http://schemas.openxmlformats.org/drawingml/2006/main" xmlns:r="http://schemas.openxmlformats.org/officeDocument/2006/relationships" xmlns:p="http://schemas.openxmlformats.org/presentationml/2006/main">
-  <p:cSld>
-    <p:spTree>
-      <p:nvGrpSpPr>
-        <p:cNvPr id="1" name=""/>
-        <p:cNvGrpSpPr/>
-        <p:nvPr/>
-      </p:nvGrpSpPr>
-      <p:grpSpPr>
-        <a:xfrm>
-          <a:off x="0" y="0"/>
-          <a:ext cx="0" cy="0"/>
-          <a:chOff x="0" y="0"/>
-          <a:chExt cx="0" cy="0"/>
-        </a:xfrm>
-      </p:grpSpPr>
-      <p:sp>
-        <p:nvSpPr>
-          <p:cNvPr id="2" name="Title 1">
-            <a:extLst>
-              <a:ext uri="{FF2B5EF4-FFF2-40B4-BE49-F238E27FC236}">
-                <a16:creationId xmlns:a16="http://schemas.microsoft.com/office/drawing/2014/main" id="{B80112D7-72C3-443B-8C4A-A4CE04E4CA6B}"/>
-              </a:ext>
-            </a:extLst>
-          </p:cNvPr>
-          <p:cNvSpPr>
-            <a:spLocks noGrp="1"/>
-          </p:cNvSpPr>
-          <p:nvPr>
-            <p:ph type="title"/>
-          </p:nvPr>
-        </p:nvSpPr>
-        <p:spPr/>
-        <p:txBody>
-          <a:bodyPr/>
-          <a:lstStyle/>
-          <a:p>
-            <a:r>
-              <a:rPr lang="en-US" dirty="0"/>
-              <a:t>Application Insights (cont.)</a:t>
-            </a:r>
-          </a:p>
-        </p:txBody>
-      </p:sp>
-      <p:pic>
-        <p:nvPicPr>
-          <p:cNvPr id="4" name="Content Placeholder 3">
-            <a:extLst>
-              <a:ext uri="{FF2B5EF4-FFF2-40B4-BE49-F238E27FC236}">
-                <a16:creationId xmlns:a16="http://schemas.microsoft.com/office/drawing/2014/main" id="{4087A6F5-422B-40C7-A5F8-7564A090BABC}"/>
-              </a:ext>
-            </a:extLst>
-          </p:cNvPr>
-          <p:cNvPicPr>
-            <a:picLocks noGrp="1" noChangeAspect="1"/>
-          </p:cNvPicPr>
-          <p:nvPr>
-            <p:ph idx="1"/>
-          </p:nvPr>
-        </p:nvPicPr>
-        <p:blipFill>
-          <a:blip r:embed="rId3"/>
-          <a:stretch>
-            <a:fillRect/>
-          </a:stretch>
-        </p:blipFill>
-        <p:spPr>
-          <a:xfrm>
-            <a:off x="2706859" y="1223963"/>
-            <a:ext cx="8376895" cy="4875212"/>
-          </a:xfrm>
-          <a:prstGeom prst="rect">
-            <a:avLst/>
-          </a:prstGeom>
-        </p:spPr>
-      </p:pic>
-    </p:spTree>
-    <p:extLst>
-      <p:ext uri="{BB962C8B-B14F-4D97-AF65-F5344CB8AC3E}">
-        <p14:creationId xmlns:p14="http://schemas.microsoft.com/office/powerpoint/2010/main" val="3972802847"/>
       </p:ext>
     </p:extLst>
   </p:cSld>

</xml_diff>